<commit_message>
bug fixes for last slide
</commit_message>
<xml_diff>
--- a/classes/prog2020/Interlude1_EfficientDNA.pptx
+++ b/classes/prog2020/Interlude1_EfficientDNA.pptx
@@ -4988,87 +4988,12 @@
           <a:chExt cx="0" cy="0"/>
         </a:xfrm>
       </p:grpSpPr>
-      <p:sp>
-        <p:nvSpPr>
-          <p:cNvPr id="4" name="TextBox 3">
-            <a:extLst>
-              <a:ext uri="{FF2B5EF4-FFF2-40B4-BE49-F238E27FC236}">
-                <a16:creationId xmlns:a16="http://schemas.microsoft.com/office/drawing/2014/main" id="{40B96C68-6682-431E-A4CC-DAABBC65E3D1}"/>
-              </a:ext>
-            </a:extLst>
-          </p:cNvPr>
-          <p:cNvSpPr txBox="1"/>
-          <p:nvPr/>
-        </p:nvSpPr>
-        <p:spPr>
-          <a:xfrm>
-            <a:off x="1473693" y="177551"/>
-            <a:ext cx="9208611" cy="646331"/>
-          </a:xfrm>
-          <a:prstGeom prst="rect">
-            <a:avLst/>
-          </a:prstGeom>
-          <a:noFill/>
-        </p:spPr>
-        <p:txBody>
-          <a:bodyPr wrap="none" rtlCol="0">
-            <a:spAutoFit/>
-          </a:bodyPr>
-          <a:lstStyle/>
-          <a:p>
-            <a:r>
-              <a:rPr lang="en-US" dirty="0">
-                <a:latin typeface="Arial" panose="020B0604020202020204" pitchFamily="34" charset="0"/>
-                <a:cs typeface="Arial" panose="020B0604020202020204" pitchFamily="34" charset="0"/>
-              </a:rPr>
-              <a:t>We can make a class that will manage the length of the original sequence for the user…</a:t>
-            </a:r>
-          </a:p>
-          <a:p>
-            <a:r>
-              <a:rPr lang="en-US" dirty="0">
-                <a:latin typeface="Arial" panose="020B0604020202020204" pitchFamily="34" charset="0"/>
-                <a:cs typeface="Arial" panose="020B0604020202020204" pitchFamily="34" charset="0"/>
-              </a:rPr>
-              <a:t>.equals and .</a:t>
-            </a:r>
-            <a:r>
-              <a:rPr lang="en-US" dirty="0" err="1">
-                <a:latin typeface="Arial" panose="020B0604020202020204" pitchFamily="34" charset="0"/>
-                <a:cs typeface="Arial" panose="020B0604020202020204" pitchFamily="34" charset="0"/>
-              </a:rPr>
-              <a:t>hashCode</a:t>
-            </a:r>
-            <a:r>
-              <a:rPr lang="en-US" dirty="0">
-                <a:latin typeface="Arial" panose="020B0604020202020204" pitchFamily="34" charset="0"/>
-                <a:cs typeface="Arial" panose="020B0604020202020204" pitchFamily="34" charset="0"/>
-              </a:rPr>
-              <a:t> return the state of the encoded sequence; </a:t>
-            </a:r>
-            <a:r>
-              <a:rPr lang="en-US" dirty="0" err="1">
-                <a:latin typeface="Arial" panose="020B0604020202020204" pitchFamily="34" charset="0"/>
-                <a:cs typeface="Arial" panose="020B0604020202020204" pitchFamily="34" charset="0"/>
-              </a:rPr>
-              <a:t>toString</a:t>
-            </a:r>
-            <a:r>
-              <a:rPr lang="en-US" dirty="0">
-                <a:latin typeface="Arial" panose="020B0604020202020204" pitchFamily="34" charset="0"/>
-                <a:cs typeface="Arial" panose="020B0604020202020204" pitchFamily="34" charset="0"/>
-              </a:rPr>
-              <a:t>() decodes</a:t>
-            </a:r>
-          </a:p>
-        </p:txBody>
-      </p:sp>
       <p:pic>
         <p:nvPicPr>
-          <p:cNvPr id="5" name="Picture 4">
-            <a:extLst>
-              <a:ext uri="{FF2B5EF4-FFF2-40B4-BE49-F238E27FC236}">
-                <a16:creationId xmlns:a16="http://schemas.microsoft.com/office/drawing/2014/main" id="{3D13A869-375C-402F-9B96-060280B07AEE}"/>
+          <p:cNvPr id="3" name="Picture 2">
+            <a:extLst>
+              <a:ext uri="{FF2B5EF4-FFF2-40B4-BE49-F238E27FC236}">
+                <a16:creationId xmlns:a16="http://schemas.microsoft.com/office/drawing/2014/main" id="{1E1B5996-37D9-4FA9-8578-20176CAB6217}"/>
               </a:ext>
             </a:extLst>
           </p:cNvPr>
@@ -5085,14 +5010,119 @@
         </p:blipFill>
         <p:spPr>
           <a:xfrm>
-            <a:off x="393238" y="876115"/>
-            <a:ext cx="5676900" cy="5372100"/>
+            <a:off x="6660211" y="619908"/>
+            <a:ext cx="4839806" cy="5966390"/>
           </a:xfrm>
           <a:prstGeom prst="rect">
             <a:avLst/>
           </a:prstGeom>
         </p:spPr>
       </p:pic>
+      <p:pic>
+        <p:nvPicPr>
+          <p:cNvPr id="2" name="Picture 1">
+            <a:extLst>
+              <a:ext uri="{FF2B5EF4-FFF2-40B4-BE49-F238E27FC236}">
+                <a16:creationId xmlns:a16="http://schemas.microsoft.com/office/drawing/2014/main" id="{BE49DCAA-A024-43E1-9A20-094FF82B6655}"/>
+              </a:ext>
+            </a:extLst>
+          </p:cNvPr>
+          <p:cNvPicPr>
+            <a:picLocks noChangeAspect="1"/>
+          </p:cNvPicPr>
+          <p:nvPr/>
+        </p:nvPicPr>
+        <p:blipFill>
+          <a:blip r:embed="rId3"/>
+          <a:stretch>
+            <a:fillRect/>
+          </a:stretch>
+        </p:blipFill>
+        <p:spPr>
+          <a:xfrm>
+            <a:off x="194338" y="664083"/>
+            <a:ext cx="6561146" cy="5425999"/>
+          </a:xfrm>
+          <a:prstGeom prst="rect">
+            <a:avLst/>
+          </a:prstGeom>
+        </p:spPr>
+      </p:pic>
+      <p:sp>
+        <p:nvSpPr>
+          <p:cNvPr id="4" name="TextBox 3">
+            <a:extLst>
+              <a:ext uri="{FF2B5EF4-FFF2-40B4-BE49-F238E27FC236}">
+                <a16:creationId xmlns:a16="http://schemas.microsoft.com/office/drawing/2014/main" id="{40B96C68-6682-431E-A4CC-DAABBC65E3D1}"/>
+              </a:ext>
+            </a:extLst>
+          </p:cNvPr>
+          <p:cNvSpPr txBox="1"/>
+          <p:nvPr/>
+        </p:nvSpPr>
+        <p:spPr>
+          <a:xfrm>
+            <a:off x="1269506" y="17752"/>
+            <a:ext cx="9208611" cy="646331"/>
+          </a:xfrm>
+          <a:prstGeom prst="rect">
+            <a:avLst/>
+          </a:prstGeom>
+          <a:noFill/>
+        </p:spPr>
+        <p:txBody>
+          <a:bodyPr wrap="none" rtlCol="0">
+            <a:spAutoFit/>
+          </a:bodyPr>
+          <a:lstStyle/>
+          <a:p>
+            <a:r>
+              <a:rPr lang="en-US" dirty="0">
+                <a:latin typeface="Arial" panose="020B0604020202020204" pitchFamily="34" charset="0"/>
+                <a:cs typeface="Arial" panose="020B0604020202020204" pitchFamily="34" charset="0"/>
+              </a:rPr>
+              <a:t>We can make a class that will manage the length of the original sequence for the user…</a:t>
+            </a:r>
+          </a:p>
+          <a:p>
+            <a:r>
+              <a:rPr lang="en-US" dirty="0">
+                <a:latin typeface="Arial" panose="020B0604020202020204" pitchFamily="34" charset="0"/>
+                <a:cs typeface="Arial" panose="020B0604020202020204" pitchFamily="34" charset="0"/>
+              </a:rPr>
+              <a:t>.equals and .</a:t>
+            </a:r>
+            <a:r>
+              <a:rPr lang="en-US" dirty="0" err="1">
+                <a:latin typeface="Arial" panose="020B0604020202020204" pitchFamily="34" charset="0"/>
+                <a:cs typeface="Arial" panose="020B0604020202020204" pitchFamily="34" charset="0"/>
+              </a:rPr>
+              <a:t>hashCode</a:t>
+            </a:r>
+            <a:r>
+              <a:rPr lang="en-US" dirty="0">
+                <a:latin typeface="Arial" panose="020B0604020202020204" pitchFamily="34" charset="0"/>
+                <a:cs typeface="Arial" panose="020B0604020202020204" pitchFamily="34" charset="0"/>
+              </a:rPr>
+              <a:t> return the state of the encoded sequence; </a:t>
+            </a:r>
+            <a:r>
+              <a:rPr lang="en-US" dirty="0" err="1">
+                <a:latin typeface="Arial" panose="020B0604020202020204" pitchFamily="34" charset="0"/>
+                <a:cs typeface="Arial" panose="020B0604020202020204" pitchFamily="34" charset="0"/>
+              </a:rPr>
+              <a:t>toString</a:t>
+            </a:r>
+            <a:r>
+              <a:rPr lang="en-US" dirty="0">
+                <a:latin typeface="Arial" panose="020B0604020202020204" pitchFamily="34" charset="0"/>
+                <a:cs typeface="Arial" panose="020B0604020202020204" pitchFamily="34" charset="0"/>
+              </a:rPr>
+              <a:t>() decodes</a:t>
+            </a:r>
+          </a:p>
+        </p:txBody>
+      </p:sp>
       <p:cxnSp>
         <p:nvCxnSpPr>
           <p:cNvPr id="7" name="Straight Connector 6">
@@ -5143,7 +5173,7 @@
         </p:nvSpPr>
         <p:spPr>
           <a:xfrm>
-            <a:off x="702819" y="6401632"/>
+            <a:off x="702819" y="6463778"/>
             <a:ext cx="11200653" cy="369332"/>
           </a:xfrm>
           <a:prstGeom prst="rect">
@@ -5163,36 +5193,6 @@
           </a:p>
         </p:txBody>
       </p:sp>
-      <p:pic>
-        <p:nvPicPr>
-          <p:cNvPr id="9" name="Picture 8">
-            <a:extLst>
-              <a:ext uri="{FF2B5EF4-FFF2-40B4-BE49-F238E27FC236}">
-                <a16:creationId xmlns:a16="http://schemas.microsoft.com/office/drawing/2014/main" id="{D80C9C9F-8488-466A-A8D4-55EFA5E07D94}"/>
-              </a:ext>
-            </a:extLst>
-          </p:cNvPr>
-          <p:cNvPicPr>
-            <a:picLocks noChangeAspect="1"/>
-          </p:cNvPicPr>
-          <p:nvPr/>
-        </p:nvPicPr>
-        <p:blipFill>
-          <a:blip r:embed="rId3"/>
-          <a:stretch>
-            <a:fillRect/>
-          </a:stretch>
-        </p:blipFill>
-        <p:spPr>
-          <a:xfrm>
-            <a:off x="6406068" y="1051078"/>
-            <a:ext cx="5785932" cy="3387757"/>
-          </a:xfrm>
-          <a:prstGeom prst="rect">
-            <a:avLst/>
-          </a:prstGeom>
-        </p:spPr>
-      </p:pic>
     </p:spTree>
     <p:extLst>
       <p:ext uri="{BB962C8B-B14F-4D97-AF65-F5344CB8AC3E}">

</xml_diff>